<commit_message>
added Day 2 slides
</commit_message>
<xml_diff>
--- a/Day 2/Design Patterns in Java/Slides/7. Where to Go from Here/where-to-go-from-here-slides.pptx
+++ b/Day 2/Design Patterns in Java/Slides/7. Where to Go from Here/where-to-go-from-here-slides.pptx
@@ -5,7 +5,7 @@
     <p:sldMasterId id="2147483648" r:id="rId1"/>
   </p:sldMasterIdLst>
   <p:notesMasterIdLst>
-    <p:notesMasterId r:id="rId21"/>
+    <p:notesMasterId r:id="rId16"/>
   </p:notesMasterIdLst>
   <p:sldIdLst>
     <p:sldId id="256" r:id="rId2"/>
@@ -21,12 +21,7 @@
     <p:sldId id="266" r:id="rId12"/>
     <p:sldId id="267" r:id="rId13"/>
     <p:sldId id="268" r:id="rId14"/>
-    <p:sldId id="269" r:id="rId15"/>
-    <p:sldId id="270" r:id="rId16"/>
-    <p:sldId id="271" r:id="rId17"/>
-    <p:sldId id="272" r:id="rId18"/>
-    <p:sldId id="273" r:id="rId19"/>
-    <p:sldId id="274" r:id="rId20"/>
+    <p:sldId id="274" r:id="rId15"/>
   </p:sldIdLst>
   <p:sldSz cx="12192000" cy="6858000"/>
   <p:notesSz cx="12192000" cy="6858000"/>
@@ -2631,1670 +2626,6 @@
 </file>
 
 <file path=ppt/slides/slide14.xml><?xml version="1.0" encoding="utf-8"?>
-<p:sld xmlns:a="http://schemas.openxmlformats.org/drawingml/2006/main" xmlns:r="http://schemas.openxmlformats.org/officeDocument/2006/relationships" xmlns:p="http://schemas.openxmlformats.org/presentationml/2006/main">
-  <p:cSld>
-    <p:spTree>
-      <p:nvGrpSpPr>
-        <p:cNvPr id="1" name=""/>
-        <p:cNvGrpSpPr/>
-        <p:nvPr/>
-      </p:nvGrpSpPr>
-      <p:grpSpPr>
-        <a:xfrm>
-          <a:off x="0" y="0"/>
-          <a:ext cx="0" cy="0"/>
-          <a:chOff x="0" y="0"/>
-          <a:chExt cx="0" cy="0"/>
-        </a:xfrm>
-      </p:grpSpPr>
-      <p:grpSp>
-        <p:nvGrpSpPr>
-          <p:cNvPr id="2" name="object 2"/>
-          <p:cNvGrpSpPr/>
-          <p:nvPr/>
-        </p:nvGrpSpPr>
-        <p:grpSpPr>
-          <a:xfrm>
-            <a:off x="0" y="0"/>
-            <a:ext cx="3856354" cy="6858000"/>
-            <a:chOff x="0" y="0"/>
-            <a:chExt cx="3856354" cy="6858000"/>
-          </a:xfrm>
-        </p:grpSpPr>
-        <p:sp>
-          <p:nvSpPr>
-            <p:cNvPr id="3" name="object 3"/>
-            <p:cNvSpPr/>
-            <p:nvPr/>
-          </p:nvSpPr>
-          <p:spPr>
-            <a:xfrm>
-              <a:off x="0" y="0"/>
-              <a:ext cx="2573020" cy="6858000"/>
-            </a:xfrm>
-            <a:custGeom>
-              <a:avLst/>
-              <a:gdLst/>
-              <a:ahLst/>
-              <a:cxnLst/>
-              <a:rect l="l" t="t" r="r" b="b"/>
-              <a:pathLst>
-                <a:path w="2573020" h="6858000">
-                  <a:moveTo>
-                    <a:pt x="2572512" y="0"/>
-                  </a:moveTo>
-                  <a:lnTo>
-                    <a:pt x="0" y="0"/>
-                  </a:lnTo>
-                  <a:lnTo>
-                    <a:pt x="0" y="6858000"/>
-                  </a:lnTo>
-                  <a:lnTo>
-                    <a:pt x="2572512" y="6858000"/>
-                  </a:lnTo>
-                  <a:lnTo>
-                    <a:pt x="2572512" y="0"/>
-                  </a:lnTo>
-                  <a:close/>
-                </a:path>
-              </a:pathLst>
-            </a:custGeom>
-            <a:solidFill>
-              <a:srgbClr val="EF5A28"/>
-            </a:solidFill>
-          </p:spPr>
-          <p:txBody>
-            <a:bodyPr wrap="square" lIns="0" tIns="0" rIns="0" bIns="0" rtlCol="0"/>
-            <a:lstStyle/>
-            <a:p>
-              <a:endParaRPr/>
-            </a:p>
-          </p:txBody>
-        </p:sp>
-        <p:sp>
-          <p:nvSpPr>
-            <p:cNvPr id="4" name="object 4"/>
-            <p:cNvSpPr/>
-            <p:nvPr/>
-          </p:nvSpPr>
-          <p:spPr>
-            <a:xfrm>
-              <a:off x="1544574" y="2542794"/>
-              <a:ext cx="2286000" cy="1917700"/>
-            </a:xfrm>
-            <a:custGeom>
-              <a:avLst/>
-              <a:gdLst/>
-              <a:ahLst/>
-              <a:cxnLst/>
-              <a:rect l="l" t="t" r="r" b="b"/>
-              <a:pathLst>
-                <a:path w="2286000" h="1917700">
-                  <a:moveTo>
-                    <a:pt x="2286000" y="0"/>
-                  </a:moveTo>
-                  <a:lnTo>
-                    <a:pt x="0" y="0"/>
-                  </a:lnTo>
-                  <a:lnTo>
-                    <a:pt x="0" y="1917191"/>
-                  </a:lnTo>
-                  <a:lnTo>
-                    <a:pt x="2286000" y="1917191"/>
-                  </a:lnTo>
-                  <a:lnTo>
-                    <a:pt x="2286000" y="0"/>
-                  </a:lnTo>
-                  <a:close/>
-                </a:path>
-              </a:pathLst>
-            </a:custGeom>
-            <a:solidFill>
-              <a:srgbClr val="FFFFFF"/>
-            </a:solidFill>
-          </p:spPr>
-          <p:txBody>
-            <a:bodyPr wrap="square" lIns="0" tIns="0" rIns="0" bIns="0" rtlCol="0"/>
-            <a:lstStyle/>
-            <a:p>
-              <a:endParaRPr/>
-            </a:p>
-          </p:txBody>
-        </p:sp>
-        <p:sp>
-          <p:nvSpPr>
-            <p:cNvPr id="5" name="object 5"/>
-            <p:cNvSpPr/>
-            <p:nvPr/>
-          </p:nvSpPr>
-          <p:spPr>
-            <a:xfrm>
-              <a:off x="1544574" y="2542794"/>
-              <a:ext cx="2286000" cy="1917700"/>
-            </a:xfrm>
-            <a:custGeom>
-              <a:avLst/>
-              <a:gdLst/>
-              <a:ahLst/>
-              <a:cxnLst/>
-              <a:rect l="l" t="t" r="r" b="b"/>
-              <a:pathLst>
-                <a:path w="2286000" h="1917700">
-                  <a:moveTo>
-                    <a:pt x="0" y="1917191"/>
-                  </a:moveTo>
-                  <a:lnTo>
-                    <a:pt x="2286000" y="1917191"/>
-                  </a:lnTo>
-                  <a:lnTo>
-                    <a:pt x="2286000" y="0"/>
-                  </a:lnTo>
-                  <a:lnTo>
-                    <a:pt x="0" y="0"/>
-                  </a:lnTo>
-                  <a:lnTo>
-                    <a:pt x="0" y="1917191"/>
-                  </a:lnTo>
-                  <a:close/>
-                </a:path>
-              </a:pathLst>
-            </a:custGeom>
-            <a:ln w="50800">
-              <a:solidFill>
-                <a:srgbClr val="EF5A28"/>
-              </a:solidFill>
-            </a:ln>
-          </p:spPr>
-          <p:txBody>
-            <a:bodyPr wrap="square" lIns="0" tIns="0" rIns="0" bIns="0" rtlCol="0"/>
-            <a:lstStyle/>
-            <a:p>
-              <a:endParaRPr/>
-            </a:p>
-          </p:txBody>
-        </p:sp>
-        <p:pic>
-          <p:nvPicPr>
-            <p:cNvPr id="6" name="object 6"/>
-            <p:cNvPicPr/>
-            <p:nvPr/>
-          </p:nvPicPr>
-          <p:blipFill>
-            <a:blip r:embed="rId2" cstate="print"/>
-            <a:stretch>
-              <a:fillRect/>
-            </a:stretch>
-          </p:blipFill>
-          <p:spPr>
-            <a:xfrm>
-              <a:off x="2080260" y="3017520"/>
-              <a:ext cx="1255776" cy="967739"/>
-            </a:xfrm>
-            <a:prstGeom prst="rect">
-              <a:avLst/>
-            </a:prstGeom>
-          </p:spPr>
-        </p:pic>
-      </p:grpSp>
-      <p:pic>
-        <p:nvPicPr>
-          <p:cNvPr id="7" name="object 7"/>
-          <p:cNvPicPr/>
-          <p:nvPr/>
-        </p:nvPicPr>
-        <p:blipFill>
-          <a:blip r:embed="rId3" cstate="print"/>
-          <a:stretch>
-            <a:fillRect/>
-          </a:stretch>
-        </p:blipFill>
-        <p:spPr>
-          <a:xfrm>
-            <a:off x="4366514" y="2720670"/>
-            <a:ext cx="2959735" cy="468172"/>
-          </a:xfrm>
-          <a:prstGeom prst="rect">
-            <a:avLst/>
-          </a:prstGeom>
-        </p:spPr>
-      </p:pic>
-      <p:grpSp>
-        <p:nvGrpSpPr>
-          <p:cNvPr id="8" name="object 8"/>
-          <p:cNvGrpSpPr/>
-          <p:nvPr/>
-        </p:nvGrpSpPr>
-        <p:grpSpPr>
-          <a:xfrm>
-            <a:off x="4424426" y="3771900"/>
-            <a:ext cx="7156450" cy="725805"/>
-            <a:chOff x="4424426" y="3771900"/>
-            <a:chExt cx="7156450" cy="725805"/>
-          </a:xfrm>
-        </p:grpSpPr>
-        <p:pic>
-          <p:nvPicPr>
-            <p:cNvPr id="9" name="object 9"/>
-            <p:cNvPicPr/>
-            <p:nvPr/>
-          </p:nvPicPr>
-          <p:blipFill>
-            <a:blip r:embed="rId4" cstate="print"/>
-            <a:stretch>
-              <a:fillRect/>
-            </a:stretch>
-          </p:blipFill>
-          <p:spPr>
-            <a:xfrm>
-              <a:off x="4428998" y="3771900"/>
-              <a:ext cx="7151497" cy="365760"/>
-            </a:xfrm>
-            <a:prstGeom prst="rect">
-              <a:avLst/>
-            </a:prstGeom>
-          </p:spPr>
-        </p:pic>
-        <p:pic>
-          <p:nvPicPr>
-            <p:cNvPr id="10" name="object 10"/>
-            <p:cNvPicPr/>
-            <p:nvPr/>
-          </p:nvPicPr>
-          <p:blipFill>
-            <a:blip r:embed="rId5" cstate="print"/>
-            <a:stretch>
-              <a:fillRect/>
-            </a:stretch>
-          </p:blipFill>
-          <p:spPr>
-            <a:xfrm>
-              <a:off x="4424426" y="4171188"/>
-              <a:ext cx="2116454" cy="326136"/>
-            </a:xfrm>
-            <a:prstGeom prst="rect">
-              <a:avLst/>
-            </a:prstGeom>
-          </p:spPr>
-        </p:pic>
-      </p:grpSp>
-      <p:sp>
-        <p:nvSpPr>
-          <p:cNvPr id="11" name="Slide Number Placeholder 10">
-            <a:extLst>
-              <a:ext uri="{FF2B5EF4-FFF2-40B4-BE49-F238E27FC236}">
-                <a16:creationId xmlns:a16="http://schemas.microsoft.com/office/drawing/2014/main" id="{E1CAE275-FF21-FD35-3744-0C1CECD5BEB2}"/>
-              </a:ext>
-            </a:extLst>
-          </p:cNvPr>
-          <p:cNvSpPr>
-            <a:spLocks noGrp="1"/>
-          </p:cNvSpPr>
-          <p:nvPr>
-            <p:ph type="sldNum" sz="quarter" idx="7"/>
-          </p:nvPr>
-        </p:nvSpPr>
-        <p:spPr/>
-        <p:txBody>
-          <a:bodyPr/>
-          <a:lstStyle/>
-          <a:p>
-            <a:fld id="{B6F15528-21DE-4FAA-801E-634DDDAF4B2B}" type="slidenum">
-              <a:rPr lang="en-IN" smtClean="0"/>
-              <a:t>14</a:t>
-            </a:fld>
-            <a:endParaRPr lang="en-IN"/>
-          </a:p>
-        </p:txBody>
-      </p:sp>
-    </p:spTree>
-  </p:cSld>
-  <p:clrMapOvr>
-    <a:masterClrMapping/>
-  </p:clrMapOvr>
-</p:sld>
-</file>
-
-<file path=ppt/slides/slide15.xml><?xml version="1.0" encoding="utf-8"?>
-<p:sld xmlns:a="http://schemas.openxmlformats.org/drawingml/2006/main" xmlns:r="http://schemas.openxmlformats.org/officeDocument/2006/relationships" xmlns:p="http://schemas.openxmlformats.org/presentationml/2006/main">
-  <p:cSld>
-    <p:spTree>
-      <p:nvGrpSpPr>
-        <p:cNvPr id="1" name=""/>
-        <p:cNvGrpSpPr/>
-        <p:nvPr/>
-      </p:nvGrpSpPr>
-      <p:grpSpPr>
-        <a:xfrm>
-          <a:off x="0" y="0"/>
-          <a:ext cx="0" cy="0"/>
-          <a:chOff x="0" y="0"/>
-          <a:chExt cx="0" cy="0"/>
-        </a:xfrm>
-      </p:grpSpPr>
-      <p:grpSp>
-        <p:nvGrpSpPr>
-          <p:cNvPr id="2" name="object 2"/>
-          <p:cNvGrpSpPr/>
-          <p:nvPr/>
-        </p:nvGrpSpPr>
-        <p:grpSpPr>
-          <a:xfrm>
-            <a:off x="0" y="0"/>
-            <a:ext cx="3856354" cy="6858000"/>
-            <a:chOff x="0" y="0"/>
-            <a:chExt cx="3856354" cy="6858000"/>
-          </a:xfrm>
-        </p:grpSpPr>
-        <p:sp>
-          <p:nvSpPr>
-            <p:cNvPr id="3" name="object 3"/>
-            <p:cNvSpPr/>
-            <p:nvPr/>
-          </p:nvSpPr>
-          <p:spPr>
-            <a:xfrm>
-              <a:off x="0" y="0"/>
-              <a:ext cx="2573020" cy="6858000"/>
-            </a:xfrm>
-            <a:custGeom>
-              <a:avLst/>
-              <a:gdLst/>
-              <a:ahLst/>
-              <a:cxnLst/>
-              <a:rect l="l" t="t" r="r" b="b"/>
-              <a:pathLst>
-                <a:path w="2573020" h="6858000">
-                  <a:moveTo>
-                    <a:pt x="2572512" y="0"/>
-                  </a:moveTo>
-                  <a:lnTo>
-                    <a:pt x="0" y="0"/>
-                  </a:lnTo>
-                  <a:lnTo>
-                    <a:pt x="0" y="6858000"/>
-                  </a:lnTo>
-                  <a:lnTo>
-                    <a:pt x="2572512" y="6858000"/>
-                  </a:lnTo>
-                  <a:lnTo>
-                    <a:pt x="2572512" y="0"/>
-                  </a:lnTo>
-                  <a:close/>
-                </a:path>
-              </a:pathLst>
-            </a:custGeom>
-            <a:solidFill>
-              <a:srgbClr val="EF5A28"/>
-            </a:solidFill>
-          </p:spPr>
-          <p:txBody>
-            <a:bodyPr wrap="square" lIns="0" tIns="0" rIns="0" bIns="0" rtlCol="0"/>
-            <a:lstStyle/>
-            <a:p>
-              <a:endParaRPr/>
-            </a:p>
-          </p:txBody>
-        </p:sp>
-        <p:sp>
-          <p:nvSpPr>
-            <p:cNvPr id="4" name="object 4"/>
-            <p:cNvSpPr/>
-            <p:nvPr/>
-          </p:nvSpPr>
-          <p:spPr>
-            <a:xfrm>
-              <a:off x="1544574" y="2542794"/>
-              <a:ext cx="2286000" cy="1917700"/>
-            </a:xfrm>
-            <a:custGeom>
-              <a:avLst/>
-              <a:gdLst/>
-              <a:ahLst/>
-              <a:cxnLst/>
-              <a:rect l="l" t="t" r="r" b="b"/>
-              <a:pathLst>
-                <a:path w="2286000" h="1917700">
-                  <a:moveTo>
-                    <a:pt x="2286000" y="0"/>
-                  </a:moveTo>
-                  <a:lnTo>
-                    <a:pt x="0" y="0"/>
-                  </a:lnTo>
-                  <a:lnTo>
-                    <a:pt x="0" y="1917191"/>
-                  </a:lnTo>
-                  <a:lnTo>
-                    <a:pt x="2286000" y="1917191"/>
-                  </a:lnTo>
-                  <a:lnTo>
-                    <a:pt x="2286000" y="0"/>
-                  </a:lnTo>
-                  <a:close/>
-                </a:path>
-              </a:pathLst>
-            </a:custGeom>
-            <a:solidFill>
-              <a:srgbClr val="FFFFFF"/>
-            </a:solidFill>
-          </p:spPr>
-          <p:txBody>
-            <a:bodyPr wrap="square" lIns="0" tIns="0" rIns="0" bIns="0" rtlCol="0"/>
-            <a:lstStyle/>
-            <a:p>
-              <a:endParaRPr/>
-            </a:p>
-          </p:txBody>
-        </p:sp>
-        <p:sp>
-          <p:nvSpPr>
-            <p:cNvPr id="5" name="object 5"/>
-            <p:cNvSpPr/>
-            <p:nvPr/>
-          </p:nvSpPr>
-          <p:spPr>
-            <a:xfrm>
-              <a:off x="1544574" y="2542794"/>
-              <a:ext cx="2286000" cy="1917700"/>
-            </a:xfrm>
-            <a:custGeom>
-              <a:avLst/>
-              <a:gdLst/>
-              <a:ahLst/>
-              <a:cxnLst/>
-              <a:rect l="l" t="t" r="r" b="b"/>
-              <a:pathLst>
-                <a:path w="2286000" h="1917700">
-                  <a:moveTo>
-                    <a:pt x="0" y="1917191"/>
-                  </a:moveTo>
-                  <a:lnTo>
-                    <a:pt x="2286000" y="1917191"/>
-                  </a:lnTo>
-                  <a:lnTo>
-                    <a:pt x="2286000" y="0"/>
-                  </a:lnTo>
-                  <a:lnTo>
-                    <a:pt x="0" y="0"/>
-                  </a:lnTo>
-                  <a:lnTo>
-                    <a:pt x="0" y="1917191"/>
-                  </a:lnTo>
-                  <a:close/>
-                </a:path>
-              </a:pathLst>
-            </a:custGeom>
-            <a:ln w="50800">
-              <a:solidFill>
-                <a:srgbClr val="EF5A28"/>
-              </a:solidFill>
-            </a:ln>
-          </p:spPr>
-          <p:txBody>
-            <a:bodyPr wrap="square" lIns="0" tIns="0" rIns="0" bIns="0" rtlCol="0"/>
-            <a:lstStyle/>
-            <a:p>
-              <a:endParaRPr/>
-            </a:p>
-          </p:txBody>
-        </p:sp>
-        <p:pic>
-          <p:nvPicPr>
-            <p:cNvPr id="6" name="object 6"/>
-            <p:cNvPicPr/>
-            <p:nvPr/>
-          </p:nvPicPr>
-          <p:blipFill>
-            <a:blip r:embed="rId2" cstate="print"/>
-            <a:stretch>
-              <a:fillRect/>
-            </a:stretch>
-          </p:blipFill>
-          <p:spPr>
-            <a:xfrm>
-              <a:off x="2080260" y="3017520"/>
-              <a:ext cx="1255776" cy="967739"/>
-            </a:xfrm>
-            <a:prstGeom prst="rect">
-              <a:avLst/>
-            </a:prstGeom>
-          </p:spPr>
-        </p:pic>
-      </p:grpSp>
-      <p:pic>
-        <p:nvPicPr>
-          <p:cNvPr id="7" name="object 7"/>
-          <p:cNvPicPr/>
-          <p:nvPr/>
-        </p:nvPicPr>
-        <p:blipFill>
-          <a:blip r:embed="rId3" cstate="print"/>
-          <a:stretch>
-            <a:fillRect/>
-          </a:stretch>
-        </p:blipFill>
-        <p:spPr>
-          <a:xfrm>
-            <a:off x="4366514" y="2720670"/>
-            <a:ext cx="6147308" cy="468172"/>
-          </a:xfrm>
-          <a:prstGeom prst="rect">
-            <a:avLst/>
-          </a:prstGeom>
-        </p:spPr>
-      </p:pic>
-      <p:grpSp>
-        <p:nvGrpSpPr>
-          <p:cNvPr id="8" name="object 8"/>
-          <p:cNvGrpSpPr/>
-          <p:nvPr/>
-        </p:nvGrpSpPr>
-        <p:grpSpPr>
-          <a:xfrm>
-            <a:off x="4424426" y="3771900"/>
-            <a:ext cx="5532755" cy="725805"/>
-            <a:chOff x="4424426" y="3771900"/>
-            <a:chExt cx="5532755" cy="725805"/>
-          </a:xfrm>
-        </p:grpSpPr>
-        <p:pic>
-          <p:nvPicPr>
-            <p:cNvPr id="9" name="object 9"/>
-            <p:cNvPicPr/>
-            <p:nvPr/>
-          </p:nvPicPr>
-          <p:blipFill>
-            <a:blip r:embed="rId4" cstate="print"/>
-            <a:stretch>
-              <a:fillRect/>
-            </a:stretch>
-          </p:blipFill>
-          <p:spPr>
-            <a:xfrm>
-              <a:off x="4428998" y="3771900"/>
-              <a:ext cx="5528056" cy="365760"/>
-            </a:xfrm>
-            <a:prstGeom prst="rect">
-              <a:avLst/>
-            </a:prstGeom>
-          </p:spPr>
-        </p:pic>
-        <p:pic>
-          <p:nvPicPr>
-            <p:cNvPr id="10" name="object 10"/>
-            <p:cNvPicPr/>
-            <p:nvPr/>
-          </p:nvPicPr>
-          <p:blipFill>
-            <a:blip r:embed="rId5" cstate="print"/>
-            <a:stretch>
-              <a:fillRect/>
-            </a:stretch>
-          </p:blipFill>
-          <p:spPr>
-            <a:xfrm>
-              <a:off x="4424426" y="4171188"/>
-              <a:ext cx="2026157" cy="326136"/>
-            </a:xfrm>
-            <a:prstGeom prst="rect">
-              <a:avLst/>
-            </a:prstGeom>
-          </p:spPr>
-        </p:pic>
-      </p:grpSp>
-      <p:sp>
-        <p:nvSpPr>
-          <p:cNvPr id="11" name="Slide Number Placeholder 10">
-            <a:extLst>
-              <a:ext uri="{FF2B5EF4-FFF2-40B4-BE49-F238E27FC236}">
-                <a16:creationId xmlns:a16="http://schemas.microsoft.com/office/drawing/2014/main" id="{9DBAA854-79FA-7A32-988F-1D68B26FD5E6}"/>
-              </a:ext>
-            </a:extLst>
-          </p:cNvPr>
-          <p:cNvSpPr>
-            <a:spLocks noGrp="1"/>
-          </p:cNvSpPr>
-          <p:nvPr>
-            <p:ph type="sldNum" sz="quarter" idx="7"/>
-          </p:nvPr>
-        </p:nvSpPr>
-        <p:spPr/>
-        <p:txBody>
-          <a:bodyPr/>
-          <a:lstStyle/>
-          <a:p>
-            <a:fld id="{B6F15528-21DE-4FAA-801E-634DDDAF4B2B}" type="slidenum">
-              <a:rPr lang="en-IN" smtClean="0"/>
-              <a:t>15</a:t>
-            </a:fld>
-            <a:endParaRPr lang="en-IN"/>
-          </a:p>
-        </p:txBody>
-      </p:sp>
-    </p:spTree>
-  </p:cSld>
-  <p:clrMapOvr>
-    <a:masterClrMapping/>
-  </p:clrMapOvr>
-</p:sld>
-</file>
-
-<file path=ppt/slides/slide16.xml><?xml version="1.0" encoding="utf-8"?>
-<p:sld xmlns:a="http://schemas.openxmlformats.org/drawingml/2006/main" xmlns:r="http://schemas.openxmlformats.org/officeDocument/2006/relationships" xmlns:p="http://schemas.openxmlformats.org/presentationml/2006/main">
-  <p:cSld>
-    <p:spTree>
-      <p:nvGrpSpPr>
-        <p:cNvPr id="1" name=""/>
-        <p:cNvGrpSpPr/>
-        <p:nvPr/>
-      </p:nvGrpSpPr>
-      <p:grpSpPr>
-        <a:xfrm>
-          <a:off x="0" y="0"/>
-          <a:ext cx="0" cy="0"/>
-          <a:chOff x="0" y="0"/>
-          <a:chExt cx="0" cy="0"/>
-        </a:xfrm>
-      </p:grpSpPr>
-      <p:grpSp>
-        <p:nvGrpSpPr>
-          <p:cNvPr id="2" name="object 2"/>
-          <p:cNvGrpSpPr/>
-          <p:nvPr/>
-        </p:nvGrpSpPr>
-        <p:grpSpPr>
-          <a:xfrm>
-            <a:off x="0" y="0"/>
-            <a:ext cx="3856354" cy="6858000"/>
-            <a:chOff x="0" y="0"/>
-            <a:chExt cx="3856354" cy="6858000"/>
-          </a:xfrm>
-        </p:grpSpPr>
-        <p:sp>
-          <p:nvSpPr>
-            <p:cNvPr id="3" name="object 3"/>
-            <p:cNvSpPr/>
-            <p:nvPr/>
-          </p:nvSpPr>
-          <p:spPr>
-            <a:xfrm>
-              <a:off x="0" y="0"/>
-              <a:ext cx="2573020" cy="6858000"/>
-            </a:xfrm>
-            <a:custGeom>
-              <a:avLst/>
-              <a:gdLst/>
-              <a:ahLst/>
-              <a:cxnLst/>
-              <a:rect l="l" t="t" r="r" b="b"/>
-              <a:pathLst>
-                <a:path w="2573020" h="6858000">
-                  <a:moveTo>
-                    <a:pt x="2572512" y="0"/>
-                  </a:moveTo>
-                  <a:lnTo>
-                    <a:pt x="0" y="0"/>
-                  </a:lnTo>
-                  <a:lnTo>
-                    <a:pt x="0" y="6858000"/>
-                  </a:lnTo>
-                  <a:lnTo>
-                    <a:pt x="2572512" y="6858000"/>
-                  </a:lnTo>
-                  <a:lnTo>
-                    <a:pt x="2572512" y="0"/>
-                  </a:lnTo>
-                  <a:close/>
-                </a:path>
-              </a:pathLst>
-            </a:custGeom>
-            <a:solidFill>
-              <a:srgbClr val="EF5A28"/>
-            </a:solidFill>
-          </p:spPr>
-          <p:txBody>
-            <a:bodyPr wrap="square" lIns="0" tIns="0" rIns="0" bIns="0" rtlCol="0"/>
-            <a:lstStyle/>
-            <a:p>
-              <a:endParaRPr/>
-            </a:p>
-          </p:txBody>
-        </p:sp>
-        <p:sp>
-          <p:nvSpPr>
-            <p:cNvPr id="4" name="object 4"/>
-            <p:cNvSpPr/>
-            <p:nvPr/>
-          </p:nvSpPr>
-          <p:spPr>
-            <a:xfrm>
-              <a:off x="1544574" y="2542794"/>
-              <a:ext cx="2286000" cy="1917700"/>
-            </a:xfrm>
-            <a:custGeom>
-              <a:avLst/>
-              <a:gdLst/>
-              <a:ahLst/>
-              <a:cxnLst/>
-              <a:rect l="l" t="t" r="r" b="b"/>
-              <a:pathLst>
-                <a:path w="2286000" h="1917700">
-                  <a:moveTo>
-                    <a:pt x="2286000" y="0"/>
-                  </a:moveTo>
-                  <a:lnTo>
-                    <a:pt x="0" y="0"/>
-                  </a:lnTo>
-                  <a:lnTo>
-                    <a:pt x="0" y="1917191"/>
-                  </a:lnTo>
-                  <a:lnTo>
-                    <a:pt x="2286000" y="1917191"/>
-                  </a:lnTo>
-                  <a:lnTo>
-                    <a:pt x="2286000" y="0"/>
-                  </a:lnTo>
-                  <a:close/>
-                </a:path>
-              </a:pathLst>
-            </a:custGeom>
-            <a:solidFill>
-              <a:srgbClr val="FFFFFF"/>
-            </a:solidFill>
-          </p:spPr>
-          <p:txBody>
-            <a:bodyPr wrap="square" lIns="0" tIns="0" rIns="0" bIns="0" rtlCol="0"/>
-            <a:lstStyle/>
-            <a:p>
-              <a:endParaRPr/>
-            </a:p>
-          </p:txBody>
-        </p:sp>
-        <p:sp>
-          <p:nvSpPr>
-            <p:cNvPr id="5" name="object 5"/>
-            <p:cNvSpPr/>
-            <p:nvPr/>
-          </p:nvSpPr>
-          <p:spPr>
-            <a:xfrm>
-              <a:off x="1544574" y="2542794"/>
-              <a:ext cx="2286000" cy="1917700"/>
-            </a:xfrm>
-            <a:custGeom>
-              <a:avLst/>
-              <a:gdLst/>
-              <a:ahLst/>
-              <a:cxnLst/>
-              <a:rect l="l" t="t" r="r" b="b"/>
-              <a:pathLst>
-                <a:path w="2286000" h="1917700">
-                  <a:moveTo>
-                    <a:pt x="0" y="1917191"/>
-                  </a:moveTo>
-                  <a:lnTo>
-                    <a:pt x="2286000" y="1917191"/>
-                  </a:lnTo>
-                  <a:lnTo>
-                    <a:pt x="2286000" y="0"/>
-                  </a:lnTo>
-                  <a:lnTo>
-                    <a:pt x="0" y="0"/>
-                  </a:lnTo>
-                  <a:lnTo>
-                    <a:pt x="0" y="1917191"/>
-                  </a:lnTo>
-                  <a:close/>
-                </a:path>
-              </a:pathLst>
-            </a:custGeom>
-            <a:ln w="50800">
-              <a:solidFill>
-                <a:srgbClr val="EF5A28"/>
-              </a:solidFill>
-            </a:ln>
-          </p:spPr>
-          <p:txBody>
-            <a:bodyPr wrap="square" lIns="0" tIns="0" rIns="0" bIns="0" rtlCol="0"/>
-            <a:lstStyle/>
-            <a:p>
-              <a:endParaRPr/>
-            </a:p>
-          </p:txBody>
-        </p:sp>
-        <p:pic>
-          <p:nvPicPr>
-            <p:cNvPr id="6" name="object 6"/>
-            <p:cNvPicPr/>
-            <p:nvPr/>
-          </p:nvPicPr>
-          <p:blipFill>
-            <a:blip r:embed="rId2" cstate="print"/>
-            <a:stretch>
-              <a:fillRect/>
-            </a:stretch>
-          </p:blipFill>
-          <p:spPr>
-            <a:xfrm>
-              <a:off x="2080260" y="3017520"/>
-              <a:ext cx="1255776" cy="967739"/>
-            </a:xfrm>
-            <a:prstGeom prst="rect">
-              <a:avLst/>
-            </a:prstGeom>
-          </p:spPr>
-        </p:pic>
-      </p:grpSp>
-      <p:pic>
-        <p:nvPicPr>
-          <p:cNvPr id="7" name="object 7"/>
-          <p:cNvPicPr/>
-          <p:nvPr/>
-        </p:nvPicPr>
-        <p:blipFill>
-          <a:blip r:embed="rId3" cstate="print"/>
-          <a:stretch>
-            <a:fillRect/>
-          </a:stretch>
-        </p:blipFill>
-        <p:spPr>
-          <a:xfrm>
-            <a:off x="4366514" y="2720670"/>
-            <a:ext cx="6147308" cy="468172"/>
-          </a:xfrm>
-          <a:prstGeom prst="rect">
-            <a:avLst/>
-          </a:prstGeom>
-        </p:spPr>
-      </p:pic>
-      <p:grpSp>
-        <p:nvGrpSpPr>
-          <p:cNvPr id="8" name="object 8"/>
-          <p:cNvGrpSpPr/>
-          <p:nvPr/>
-        </p:nvGrpSpPr>
-        <p:grpSpPr>
-          <a:xfrm>
-            <a:off x="4424426" y="3771900"/>
-            <a:ext cx="5487670" cy="725805"/>
-            <a:chOff x="4424426" y="3771900"/>
-            <a:chExt cx="5487670" cy="725805"/>
-          </a:xfrm>
-        </p:grpSpPr>
-        <p:pic>
-          <p:nvPicPr>
-            <p:cNvPr id="9" name="object 9"/>
-            <p:cNvPicPr/>
-            <p:nvPr/>
-          </p:nvPicPr>
-          <p:blipFill>
-            <a:blip r:embed="rId4" cstate="print"/>
-            <a:stretch>
-              <a:fillRect/>
-            </a:stretch>
-          </p:blipFill>
-          <p:spPr>
-            <a:xfrm>
-              <a:off x="4428998" y="3771900"/>
-              <a:ext cx="5482590" cy="365760"/>
-            </a:xfrm>
-            <a:prstGeom prst="rect">
-              <a:avLst/>
-            </a:prstGeom>
-          </p:spPr>
-        </p:pic>
-        <p:pic>
-          <p:nvPicPr>
-            <p:cNvPr id="10" name="object 10"/>
-            <p:cNvPicPr/>
-            <p:nvPr/>
-          </p:nvPicPr>
-          <p:blipFill>
-            <a:blip r:embed="rId5" cstate="print"/>
-            <a:stretch>
-              <a:fillRect/>
-            </a:stretch>
-          </p:blipFill>
-          <p:spPr>
-            <a:xfrm>
-              <a:off x="4424426" y="4171188"/>
-              <a:ext cx="2026157" cy="326136"/>
-            </a:xfrm>
-            <a:prstGeom prst="rect">
-              <a:avLst/>
-            </a:prstGeom>
-          </p:spPr>
-        </p:pic>
-      </p:grpSp>
-      <p:sp>
-        <p:nvSpPr>
-          <p:cNvPr id="11" name="Slide Number Placeholder 10">
-            <a:extLst>
-              <a:ext uri="{FF2B5EF4-FFF2-40B4-BE49-F238E27FC236}">
-                <a16:creationId xmlns:a16="http://schemas.microsoft.com/office/drawing/2014/main" id="{7AA0C6EA-91CD-7EAB-167A-83CD334F952F}"/>
-              </a:ext>
-            </a:extLst>
-          </p:cNvPr>
-          <p:cNvSpPr>
-            <a:spLocks noGrp="1"/>
-          </p:cNvSpPr>
-          <p:nvPr>
-            <p:ph type="sldNum" sz="quarter" idx="7"/>
-          </p:nvPr>
-        </p:nvSpPr>
-        <p:spPr/>
-        <p:txBody>
-          <a:bodyPr/>
-          <a:lstStyle/>
-          <a:p>
-            <a:fld id="{B6F15528-21DE-4FAA-801E-634DDDAF4B2B}" type="slidenum">
-              <a:rPr lang="en-IN" smtClean="0"/>
-              <a:t>16</a:t>
-            </a:fld>
-            <a:endParaRPr lang="en-IN"/>
-          </a:p>
-        </p:txBody>
-      </p:sp>
-    </p:spTree>
-  </p:cSld>
-  <p:clrMapOvr>
-    <a:masterClrMapping/>
-  </p:clrMapOvr>
-</p:sld>
-</file>
-
-<file path=ppt/slides/slide17.xml><?xml version="1.0" encoding="utf-8"?>
-<p:sld xmlns:a="http://schemas.openxmlformats.org/drawingml/2006/main" xmlns:r="http://schemas.openxmlformats.org/officeDocument/2006/relationships" xmlns:p="http://schemas.openxmlformats.org/presentationml/2006/main">
-  <p:cSld>
-    <p:spTree>
-      <p:nvGrpSpPr>
-        <p:cNvPr id="1" name=""/>
-        <p:cNvGrpSpPr/>
-        <p:nvPr/>
-      </p:nvGrpSpPr>
-      <p:grpSpPr>
-        <a:xfrm>
-          <a:off x="0" y="0"/>
-          <a:ext cx="0" cy="0"/>
-          <a:chOff x="0" y="0"/>
-          <a:chExt cx="0" cy="0"/>
-        </a:xfrm>
-      </p:grpSpPr>
-      <p:grpSp>
-        <p:nvGrpSpPr>
-          <p:cNvPr id="2" name="object 2"/>
-          <p:cNvGrpSpPr/>
-          <p:nvPr/>
-        </p:nvGrpSpPr>
-        <p:grpSpPr>
-          <a:xfrm>
-            <a:off x="0" y="0"/>
-            <a:ext cx="3856354" cy="6858000"/>
-            <a:chOff x="0" y="0"/>
-            <a:chExt cx="3856354" cy="6858000"/>
-          </a:xfrm>
-        </p:grpSpPr>
-        <p:sp>
-          <p:nvSpPr>
-            <p:cNvPr id="3" name="object 3"/>
-            <p:cNvSpPr/>
-            <p:nvPr/>
-          </p:nvSpPr>
-          <p:spPr>
-            <a:xfrm>
-              <a:off x="0" y="0"/>
-              <a:ext cx="2573020" cy="6858000"/>
-            </a:xfrm>
-            <a:custGeom>
-              <a:avLst/>
-              <a:gdLst/>
-              <a:ahLst/>
-              <a:cxnLst/>
-              <a:rect l="l" t="t" r="r" b="b"/>
-              <a:pathLst>
-                <a:path w="2573020" h="6858000">
-                  <a:moveTo>
-                    <a:pt x="2572512" y="0"/>
-                  </a:moveTo>
-                  <a:lnTo>
-                    <a:pt x="0" y="0"/>
-                  </a:lnTo>
-                  <a:lnTo>
-                    <a:pt x="0" y="6858000"/>
-                  </a:lnTo>
-                  <a:lnTo>
-                    <a:pt x="2572512" y="6858000"/>
-                  </a:lnTo>
-                  <a:lnTo>
-                    <a:pt x="2572512" y="0"/>
-                  </a:lnTo>
-                  <a:close/>
-                </a:path>
-              </a:pathLst>
-            </a:custGeom>
-            <a:solidFill>
-              <a:srgbClr val="EF5A28"/>
-            </a:solidFill>
-          </p:spPr>
-          <p:txBody>
-            <a:bodyPr wrap="square" lIns="0" tIns="0" rIns="0" bIns="0" rtlCol="0"/>
-            <a:lstStyle/>
-            <a:p>
-              <a:endParaRPr/>
-            </a:p>
-          </p:txBody>
-        </p:sp>
-        <p:sp>
-          <p:nvSpPr>
-            <p:cNvPr id="4" name="object 4"/>
-            <p:cNvSpPr/>
-            <p:nvPr/>
-          </p:nvSpPr>
-          <p:spPr>
-            <a:xfrm>
-              <a:off x="1544574" y="2542794"/>
-              <a:ext cx="2286000" cy="1917700"/>
-            </a:xfrm>
-            <a:custGeom>
-              <a:avLst/>
-              <a:gdLst/>
-              <a:ahLst/>
-              <a:cxnLst/>
-              <a:rect l="l" t="t" r="r" b="b"/>
-              <a:pathLst>
-                <a:path w="2286000" h="1917700">
-                  <a:moveTo>
-                    <a:pt x="2286000" y="0"/>
-                  </a:moveTo>
-                  <a:lnTo>
-                    <a:pt x="0" y="0"/>
-                  </a:lnTo>
-                  <a:lnTo>
-                    <a:pt x="0" y="1917191"/>
-                  </a:lnTo>
-                  <a:lnTo>
-                    <a:pt x="2286000" y="1917191"/>
-                  </a:lnTo>
-                  <a:lnTo>
-                    <a:pt x="2286000" y="0"/>
-                  </a:lnTo>
-                  <a:close/>
-                </a:path>
-              </a:pathLst>
-            </a:custGeom>
-            <a:solidFill>
-              <a:srgbClr val="FFFFFF"/>
-            </a:solidFill>
-          </p:spPr>
-          <p:txBody>
-            <a:bodyPr wrap="square" lIns="0" tIns="0" rIns="0" bIns="0" rtlCol="0"/>
-            <a:lstStyle/>
-            <a:p>
-              <a:endParaRPr/>
-            </a:p>
-          </p:txBody>
-        </p:sp>
-        <p:sp>
-          <p:nvSpPr>
-            <p:cNvPr id="5" name="object 5"/>
-            <p:cNvSpPr/>
-            <p:nvPr/>
-          </p:nvSpPr>
-          <p:spPr>
-            <a:xfrm>
-              <a:off x="1544574" y="2542794"/>
-              <a:ext cx="2286000" cy="1917700"/>
-            </a:xfrm>
-            <a:custGeom>
-              <a:avLst/>
-              <a:gdLst/>
-              <a:ahLst/>
-              <a:cxnLst/>
-              <a:rect l="l" t="t" r="r" b="b"/>
-              <a:pathLst>
-                <a:path w="2286000" h="1917700">
-                  <a:moveTo>
-                    <a:pt x="0" y="1917191"/>
-                  </a:moveTo>
-                  <a:lnTo>
-                    <a:pt x="2286000" y="1917191"/>
-                  </a:lnTo>
-                  <a:lnTo>
-                    <a:pt x="2286000" y="0"/>
-                  </a:lnTo>
-                  <a:lnTo>
-                    <a:pt x="0" y="0"/>
-                  </a:lnTo>
-                  <a:lnTo>
-                    <a:pt x="0" y="1917191"/>
-                  </a:lnTo>
-                  <a:close/>
-                </a:path>
-              </a:pathLst>
-            </a:custGeom>
-            <a:ln w="50800">
-              <a:solidFill>
-                <a:srgbClr val="EF5A28"/>
-              </a:solidFill>
-            </a:ln>
-          </p:spPr>
-          <p:txBody>
-            <a:bodyPr wrap="square" lIns="0" tIns="0" rIns="0" bIns="0" rtlCol="0"/>
-            <a:lstStyle/>
-            <a:p>
-              <a:endParaRPr/>
-            </a:p>
-          </p:txBody>
-        </p:sp>
-        <p:pic>
-          <p:nvPicPr>
-            <p:cNvPr id="6" name="object 6"/>
-            <p:cNvPicPr/>
-            <p:nvPr/>
-          </p:nvPicPr>
-          <p:blipFill>
-            <a:blip r:embed="rId2" cstate="print"/>
-            <a:stretch>
-              <a:fillRect/>
-            </a:stretch>
-          </p:blipFill>
-          <p:spPr>
-            <a:xfrm>
-              <a:off x="2080260" y="3017520"/>
-              <a:ext cx="1255776" cy="967739"/>
-            </a:xfrm>
-            <a:prstGeom prst="rect">
-              <a:avLst/>
-            </a:prstGeom>
-          </p:spPr>
-        </p:pic>
-      </p:grpSp>
-      <p:pic>
-        <p:nvPicPr>
-          <p:cNvPr id="7" name="object 7"/>
-          <p:cNvPicPr/>
-          <p:nvPr/>
-        </p:nvPicPr>
-        <p:blipFill>
-          <a:blip r:embed="rId3" cstate="print"/>
-          <a:stretch>
-            <a:fillRect/>
-          </a:stretch>
-        </p:blipFill>
-        <p:spPr>
-          <a:xfrm>
-            <a:off x="4366514" y="2720670"/>
-            <a:ext cx="6147308" cy="468172"/>
-          </a:xfrm>
-          <a:prstGeom prst="rect">
-            <a:avLst/>
-          </a:prstGeom>
-        </p:spPr>
-      </p:pic>
-      <p:grpSp>
-        <p:nvGrpSpPr>
-          <p:cNvPr id="8" name="object 8"/>
-          <p:cNvGrpSpPr/>
-          <p:nvPr/>
-        </p:nvGrpSpPr>
-        <p:grpSpPr>
-          <a:xfrm>
-            <a:off x="4424426" y="3771900"/>
-            <a:ext cx="5418455" cy="725805"/>
-            <a:chOff x="4424426" y="3771900"/>
-            <a:chExt cx="5418455" cy="725805"/>
-          </a:xfrm>
-        </p:grpSpPr>
-        <p:pic>
-          <p:nvPicPr>
-            <p:cNvPr id="9" name="object 9"/>
-            <p:cNvPicPr/>
-            <p:nvPr/>
-          </p:nvPicPr>
-          <p:blipFill>
-            <a:blip r:embed="rId4" cstate="print"/>
-            <a:stretch>
-              <a:fillRect/>
-            </a:stretch>
-          </p:blipFill>
-          <p:spPr>
-            <a:xfrm>
-              <a:off x="4428998" y="3771900"/>
-              <a:ext cx="5413629" cy="365760"/>
-            </a:xfrm>
-            <a:prstGeom prst="rect">
-              <a:avLst/>
-            </a:prstGeom>
-          </p:spPr>
-        </p:pic>
-        <p:pic>
-          <p:nvPicPr>
-            <p:cNvPr id="10" name="object 10"/>
-            <p:cNvPicPr/>
-            <p:nvPr/>
-          </p:nvPicPr>
-          <p:blipFill>
-            <a:blip r:embed="rId5" cstate="print"/>
-            <a:stretch>
-              <a:fillRect/>
-            </a:stretch>
-          </p:blipFill>
-          <p:spPr>
-            <a:xfrm>
-              <a:off x="4424426" y="4171188"/>
-              <a:ext cx="2026157" cy="326136"/>
-            </a:xfrm>
-            <a:prstGeom prst="rect">
-              <a:avLst/>
-            </a:prstGeom>
-          </p:spPr>
-        </p:pic>
-      </p:grpSp>
-      <p:sp>
-        <p:nvSpPr>
-          <p:cNvPr id="11" name="Slide Number Placeholder 10">
-            <a:extLst>
-              <a:ext uri="{FF2B5EF4-FFF2-40B4-BE49-F238E27FC236}">
-                <a16:creationId xmlns:a16="http://schemas.microsoft.com/office/drawing/2014/main" id="{B780A052-00A8-1C9F-CCD0-1886A4DBE09A}"/>
-              </a:ext>
-            </a:extLst>
-          </p:cNvPr>
-          <p:cNvSpPr>
-            <a:spLocks noGrp="1"/>
-          </p:cNvSpPr>
-          <p:nvPr>
-            <p:ph type="sldNum" sz="quarter" idx="7"/>
-          </p:nvPr>
-        </p:nvSpPr>
-        <p:spPr/>
-        <p:txBody>
-          <a:bodyPr/>
-          <a:lstStyle/>
-          <a:p>
-            <a:fld id="{B6F15528-21DE-4FAA-801E-634DDDAF4B2B}" type="slidenum">
-              <a:rPr lang="en-IN" smtClean="0"/>
-              <a:t>17</a:t>
-            </a:fld>
-            <a:endParaRPr lang="en-IN"/>
-          </a:p>
-        </p:txBody>
-      </p:sp>
-    </p:spTree>
-  </p:cSld>
-  <p:clrMapOvr>
-    <a:masterClrMapping/>
-  </p:clrMapOvr>
-</p:sld>
-</file>
-
-<file path=ppt/slides/slide18.xml><?xml version="1.0" encoding="utf-8"?>
-<p:sld xmlns:a="http://schemas.openxmlformats.org/drawingml/2006/main" xmlns:r="http://schemas.openxmlformats.org/officeDocument/2006/relationships" xmlns:p="http://schemas.openxmlformats.org/presentationml/2006/main">
-  <p:cSld>
-    <p:spTree>
-      <p:nvGrpSpPr>
-        <p:cNvPr id="1" name=""/>
-        <p:cNvGrpSpPr/>
-        <p:nvPr/>
-      </p:nvGrpSpPr>
-      <p:grpSpPr>
-        <a:xfrm>
-          <a:off x="0" y="0"/>
-          <a:ext cx="0" cy="0"/>
-          <a:chOff x="0" y="0"/>
-          <a:chExt cx="0" cy="0"/>
-        </a:xfrm>
-      </p:grpSpPr>
-      <p:grpSp>
-        <p:nvGrpSpPr>
-          <p:cNvPr id="2" name="object 2"/>
-          <p:cNvGrpSpPr/>
-          <p:nvPr/>
-        </p:nvGrpSpPr>
-        <p:grpSpPr>
-          <a:xfrm>
-            <a:off x="0" y="0"/>
-            <a:ext cx="3856354" cy="6858000"/>
-            <a:chOff x="0" y="0"/>
-            <a:chExt cx="3856354" cy="6858000"/>
-          </a:xfrm>
-        </p:grpSpPr>
-        <p:sp>
-          <p:nvSpPr>
-            <p:cNvPr id="3" name="object 3"/>
-            <p:cNvSpPr/>
-            <p:nvPr/>
-          </p:nvSpPr>
-          <p:spPr>
-            <a:xfrm>
-              <a:off x="0" y="0"/>
-              <a:ext cx="2573020" cy="6858000"/>
-            </a:xfrm>
-            <a:custGeom>
-              <a:avLst/>
-              <a:gdLst/>
-              <a:ahLst/>
-              <a:cxnLst/>
-              <a:rect l="l" t="t" r="r" b="b"/>
-              <a:pathLst>
-                <a:path w="2573020" h="6858000">
-                  <a:moveTo>
-                    <a:pt x="2572512" y="0"/>
-                  </a:moveTo>
-                  <a:lnTo>
-                    <a:pt x="0" y="0"/>
-                  </a:lnTo>
-                  <a:lnTo>
-                    <a:pt x="0" y="6858000"/>
-                  </a:lnTo>
-                  <a:lnTo>
-                    <a:pt x="2572512" y="6858000"/>
-                  </a:lnTo>
-                  <a:lnTo>
-                    <a:pt x="2572512" y="0"/>
-                  </a:lnTo>
-                  <a:close/>
-                </a:path>
-              </a:pathLst>
-            </a:custGeom>
-            <a:solidFill>
-              <a:srgbClr val="EF5A28"/>
-            </a:solidFill>
-          </p:spPr>
-          <p:txBody>
-            <a:bodyPr wrap="square" lIns="0" tIns="0" rIns="0" bIns="0" rtlCol="0"/>
-            <a:lstStyle/>
-            <a:p>
-              <a:endParaRPr/>
-            </a:p>
-          </p:txBody>
-        </p:sp>
-        <p:sp>
-          <p:nvSpPr>
-            <p:cNvPr id="4" name="object 4"/>
-            <p:cNvSpPr/>
-            <p:nvPr/>
-          </p:nvSpPr>
-          <p:spPr>
-            <a:xfrm>
-              <a:off x="1544574" y="2542794"/>
-              <a:ext cx="2286000" cy="1917700"/>
-            </a:xfrm>
-            <a:custGeom>
-              <a:avLst/>
-              <a:gdLst/>
-              <a:ahLst/>
-              <a:cxnLst/>
-              <a:rect l="l" t="t" r="r" b="b"/>
-              <a:pathLst>
-                <a:path w="2286000" h="1917700">
-                  <a:moveTo>
-                    <a:pt x="2286000" y="0"/>
-                  </a:moveTo>
-                  <a:lnTo>
-                    <a:pt x="0" y="0"/>
-                  </a:lnTo>
-                  <a:lnTo>
-                    <a:pt x="0" y="1917191"/>
-                  </a:lnTo>
-                  <a:lnTo>
-                    <a:pt x="2286000" y="1917191"/>
-                  </a:lnTo>
-                  <a:lnTo>
-                    <a:pt x="2286000" y="0"/>
-                  </a:lnTo>
-                  <a:close/>
-                </a:path>
-              </a:pathLst>
-            </a:custGeom>
-            <a:solidFill>
-              <a:srgbClr val="FFFFFF"/>
-            </a:solidFill>
-          </p:spPr>
-          <p:txBody>
-            <a:bodyPr wrap="square" lIns="0" tIns="0" rIns="0" bIns="0" rtlCol="0"/>
-            <a:lstStyle/>
-            <a:p>
-              <a:endParaRPr/>
-            </a:p>
-          </p:txBody>
-        </p:sp>
-        <p:sp>
-          <p:nvSpPr>
-            <p:cNvPr id="5" name="object 5"/>
-            <p:cNvSpPr/>
-            <p:nvPr/>
-          </p:nvSpPr>
-          <p:spPr>
-            <a:xfrm>
-              <a:off x="1544574" y="2542794"/>
-              <a:ext cx="2286000" cy="1917700"/>
-            </a:xfrm>
-            <a:custGeom>
-              <a:avLst/>
-              <a:gdLst/>
-              <a:ahLst/>
-              <a:cxnLst/>
-              <a:rect l="l" t="t" r="r" b="b"/>
-              <a:pathLst>
-                <a:path w="2286000" h="1917700">
-                  <a:moveTo>
-                    <a:pt x="0" y="1917191"/>
-                  </a:moveTo>
-                  <a:lnTo>
-                    <a:pt x="2286000" y="1917191"/>
-                  </a:lnTo>
-                  <a:lnTo>
-                    <a:pt x="2286000" y="0"/>
-                  </a:lnTo>
-                  <a:lnTo>
-                    <a:pt x="0" y="0"/>
-                  </a:lnTo>
-                  <a:lnTo>
-                    <a:pt x="0" y="1917191"/>
-                  </a:lnTo>
-                  <a:close/>
-                </a:path>
-              </a:pathLst>
-            </a:custGeom>
-            <a:ln w="50800">
-              <a:solidFill>
-                <a:srgbClr val="EF5A28"/>
-              </a:solidFill>
-            </a:ln>
-          </p:spPr>
-          <p:txBody>
-            <a:bodyPr wrap="square" lIns="0" tIns="0" rIns="0" bIns="0" rtlCol="0"/>
-            <a:lstStyle/>
-            <a:p>
-              <a:endParaRPr/>
-            </a:p>
-          </p:txBody>
-        </p:sp>
-        <p:pic>
-          <p:nvPicPr>
-            <p:cNvPr id="6" name="object 6"/>
-            <p:cNvPicPr/>
-            <p:nvPr/>
-          </p:nvPicPr>
-          <p:blipFill>
-            <a:blip r:embed="rId2" cstate="print"/>
-            <a:stretch>
-              <a:fillRect/>
-            </a:stretch>
-          </p:blipFill>
-          <p:spPr>
-            <a:xfrm>
-              <a:off x="2080260" y="3017520"/>
-              <a:ext cx="1255776" cy="967739"/>
-            </a:xfrm>
-            <a:prstGeom prst="rect">
-              <a:avLst/>
-            </a:prstGeom>
-          </p:spPr>
-        </p:pic>
-      </p:grpSp>
-      <p:pic>
-        <p:nvPicPr>
-          <p:cNvPr id="7" name="object 7"/>
-          <p:cNvPicPr/>
-          <p:nvPr/>
-        </p:nvPicPr>
-        <p:blipFill>
-          <a:blip r:embed="rId3" cstate="print"/>
-          <a:stretch>
-            <a:fillRect/>
-          </a:stretch>
-        </p:blipFill>
-        <p:spPr>
-          <a:xfrm>
-            <a:off x="4366514" y="2720670"/>
-            <a:ext cx="6147308" cy="468172"/>
-          </a:xfrm>
-          <a:prstGeom prst="rect">
-            <a:avLst/>
-          </a:prstGeom>
-        </p:spPr>
-      </p:pic>
-      <p:grpSp>
-        <p:nvGrpSpPr>
-          <p:cNvPr id="8" name="object 8"/>
-          <p:cNvGrpSpPr/>
-          <p:nvPr/>
-        </p:nvGrpSpPr>
-        <p:grpSpPr>
-          <a:xfrm>
-            <a:off x="4424426" y="3405581"/>
-            <a:ext cx="4906645" cy="1092200"/>
-            <a:chOff x="4424426" y="3405581"/>
-            <a:chExt cx="4906645" cy="1092200"/>
-          </a:xfrm>
-        </p:grpSpPr>
-        <p:pic>
-          <p:nvPicPr>
-            <p:cNvPr id="9" name="object 9"/>
-            <p:cNvPicPr/>
-            <p:nvPr/>
-          </p:nvPicPr>
-          <p:blipFill>
-            <a:blip r:embed="rId4" cstate="print"/>
-            <a:stretch>
-              <a:fillRect/>
-            </a:stretch>
-          </p:blipFill>
-          <p:spPr>
-            <a:xfrm>
-              <a:off x="4428998" y="3405581"/>
-              <a:ext cx="4902073" cy="366064"/>
-            </a:xfrm>
-            <a:prstGeom prst="rect">
-              <a:avLst/>
-            </a:prstGeom>
-          </p:spPr>
-        </p:pic>
-        <p:pic>
-          <p:nvPicPr>
-            <p:cNvPr id="10" name="object 10"/>
-            <p:cNvPicPr/>
-            <p:nvPr/>
-          </p:nvPicPr>
-          <p:blipFill>
-            <a:blip r:embed="rId5" cstate="print"/>
-            <a:stretch>
-              <a:fillRect/>
-            </a:stretch>
-          </p:blipFill>
-          <p:spPr>
-            <a:xfrm>
-              <a:off x="4424426" y="3771900"/>
-              <a:ext cx="3444875" cy="365760"/>
-            </a:xfrm>
-            <a:prstGeom prst="rect">
-              <a:avLst/>
-            </a:prstGeom>
-          </p:spPr>
-        </p:pic>
-        <p:pic>
-          <p:nvPicPr>
-            <p:cNvPr id="11" name="object 11"/>
-            <p:cNvPicPr/>
-            <p:nvPr/>
-          </p:nvPicPr>
-          <p:blipFill>
-            <a:blip r:embed="rId6" cstate="print"/>
-            <a:stretch>
-              <a:fillRect/>
-            </a:stretch>
-          </p:blipFill>
-          <p:spPr>
-            <a:xfrm>
-              <a:off x="4424426" y="4171188"/>
-              <a:ext cx="850760" cy="326136"/>
-            </a:xfrm>
-            <a:prstGeom prst="rect">
-              <a:avLst/>
-            </a:prstGeom>
-          </p:spPr>
-        </p:pic>
-        <p:pic>
-          <p:nvPicPr>
-            <p:cNvPr id="12" name="object 12"/>
-            <p:cNvPicPr/>
-            <p:nvPr/>
-          </p:nvPicPr>
-          <p:blipFill>
-            <a:blip r:embed="rId7" cstate="print"/>
-            <a:stretch>
-              <a:fillRect/>
-            </a:stretch>
-          </p:blipFill>
-          <p:spPr>
-            <a:xfrm>
-              <a:off x="5133467" y="4171188"/>
-              <a:ext cx="1382903" cy="326136"/>
-            </a:xfrm>
-            <a:prstGeom prst="rect">
-              <a:avLst/>
-            </a:prstGeom>
-          </p:spPr>
-        </p:pic>
-      </p:grpSp>
-      <p:sp>
-        <p:nvSpPr>
-          <p:cNvPr id="13" name="Slide Number Placeholder 12">
-            <a:extLst>
-              <a:ext uri="{FF2B5EF4-FFF2-40B4-BE49-F238E27FC236}">
-                <a16:creationId xmlns:a16="http://schemas.microsoft.com/office/drawing/2014/main" id="{D43769DC-2892-9F74-4A57-A3C78B854128}"/>
-              </a:ext>
-            </a:extLst>
-          </p:cNvPr>
-          <p:cNvSpPr>
-            <a:spLocks noGrp="1"/>
-          </p:cNvSpPr>
-          <p:nvPr>
-            <p:ph type="sldNum" sz="quarter" idx="7"/>
-          </p:nvPr>
-        </p:nvSpPr>
-        <p:spPr/>
-        <p:txBody>
-          <a:bodyPr/>
-          <a:lstStyle/>
-          <a:p>
-            <a:fld id="{B6F15528-21DE-4FAA-801E-634DDDAF4B2B}" type="slidenum">
-              <a:rPr lang="en-IN" smtClean="0"/>
-              <a:t>18</a:t>
-            </a:fld>
-            <a:endParaRPr lang="en-IN"/>
-          </a:p>
-        </p:txBody>
-      </p:sp>
-    </p:spTree>
-  </p:cSld>
-  <p:clrMapOvr>
-    <a:masterClrMapping/>
-  </p:clrMapOvr>
-</p:sld>
-</file>
-
-<file path=ppt/slides/slide19.xml><?xml version="1.0" encoding="utf-8"?>
 <p:sld xmlns:a="http://schemas.openxmlformats.org/drawingml/2006/main" xmlns:r="http://schemas.openxmlformats.org/officeDocument/2006/relationships" xmlns:p="http://schemas.openxmlformats.org/presentationml/2006/main" showMasterSp="0">
   <p:cSld>
     <p:spTree>
@@ -4363,34 +2694,12 @@
       </p:sp>
       <p:pic>
         <p:nvPicPr>
-          <p:cNvPr id="3" name="object 3"/>
+          <p:cNvPr id="4" name="object 4"/>
           <p:cNvPicPr/>
           <p:nvPr/>
         </p:nvPicPr>
         <p:blipFill>
           <a:blip r:embed="rId2" cstate="print"/>
-          <a:stretch>
-            <a:fillRect/>
-          </a:stretch>
-        </p:blipFill>
-        <p:spPr>
-          <a:xfrm>
-            <a:off x="11495531" y="6184391"/>
-            <a:ext cx="451103" cy="449580"/>
-          </a:xfrm>
-          <a:prstGeom prst="rect">
-            <a:avLst/>
-          </a:prstGeom>
-        </p:spPr>
-      </p:pic>
-      <p:pic>
-        <p:nvPicPr>
-          <p:cNvPr id="4" name="object 4"/>
-          <p:cNvPicPr/>
-          <p:nvPr/>
-        </p:nvPicPr>
-        <p:blipFill>
-          <a:blip r:embed="rId3" cstate="print"/>
           <a:stretch>
             <a:fillRect/>
           </a:stretch>
@@ -4428,7 +2737,7 @@
           <a:p>
             <a:fld id="{B6F15528-21DE-4FAA-801E-634DDDAF4B2B}" type="slidenum">
               <a:rPr lang="en-IN" smtClean="0"/>
-              <a:t>19</a:t>
+              <a:t>14</a:t>
             </a:fld>
             <a:endParaRPr lang="en-IN"/>
           </a:p>
@@ -4749,28 +3058,6 @@
           </a:p>
         </p:txBody>
       </p:sp>
-      <p:pic>
-        <p:nvPicPr>
-          <p:cNvPr id="3" name="object 3"/>
-          <p:cNvPicPr/>
-          <p:nvPr/>
-        </p:nvPicPr>
-        <p:blipFill>
-          <a:blip r:embed="rId2" cstate="print"/>
-          <a:stretch>
-            <a:fillRect/>
-          </a:stretch>
-        </p:blipFill>
-        <p:spPr>
-          <a:xfrm>
-            <a:off x="11495531" y="6184391"/>
-            <a:ext cx="451103" cy="449580"/>
-          </a:xfrm>
-          <a:prstGeom prst="rect">
-            <a:avLst/>
-          </a:prstGeom>
-        </p:spPr>
-      </p:pic>
       <p:grpSp>
         <p:nvGrpSpPr>
           <p:cNvPr id="4" name="object 4"/>
@@ -4792,7 +3079,7 @@
             <p:nvPr/>
           </p:nvPicPr>
           <p:blipFill>
-            <a:blip r:embed="rId3" cstate="print"/>
+            <a:blip r:embed="rId2" cstate="print"/>
             <a:stretch>
               <a:fillRect/>
             </a:stretch>
@@ -4814,7 +3101,7 @@
             <p:nvPr/>
           </p:nvPicPr>
           <p:blipFill>
-            <a:blip r:embed="rId4" cstate="print"/>
+            <a:blip r:embed="rId3" cstate="print"/>
             <a:stretch>
               <a:fillRect/>
             </a:stretch>

</xml_diff>